<commit_message>
Archivo PPT del curso
</commit_message>
<xml_diff>
--- a/RoadMap.pptx
+++ b/RoadMap.pptx
@@ -5,12 +5,13 @@
     <p:sldMasterId id="2147483648" r:id="rId1"/>
   </p:sldMasterIdLst>
   <p:notesMasterIdLst>
-    <p:notesMasterId r:id="rId5"/>
+    <p:notesMasterId r:id="rId6"/>
   </p:notesMasterIdLst>
   <p:sldIdLst>
     <p:sldId id="256" r:id="rId2"/>
     <p:sldId id="257" r:id="rId3"/>
     <p:sldId id="258" r:id="rId4"/>
+    <p:sldId id="259" r:id="rId5"/>
   </p:sldIdLst>
   <p:sldSz cx="12192000" cy="6858000"/>
   <p:notesSz cx="6858000" cy="9144000"/>
@@ -9852,7 +9853,7 @@
         </p:nvSpPr>
         <p:spPr>
           <a:xfrm>
-            <a:off x="609600" y="982395"/>
+            <a:off x="769088" y="1492758"/>
             <a:ext cx="6096000" cy="646331"/>
           </a:xfrm>
           <a:prstGeom prst="rect">
@@ -9887,7 +9888,7 @@
         </p:nvSpPr>
         <p:spPr>
           <a:xfrm>
-            <a:off x="467360" y="2065774"/>
+            <a:off x="811661" y="2316984"/>
             <a:ext cx="6096000" cy="369332"/>
           </a:xfrm>
           <a:prstGeom prst="rect">
@@ -9905,6 +9906,46 @@
               <a:rPr lang="en-US" dirty="0"/>
               <a:t>Linux: https://www.siteground.es/kb/instalar-git-linux-macos/</a:t>
             </a:r>
+          </a:p>
+        </p:txBody>
+      </p:sp>
+      <p:sp>
+        <p:nvSpPr>
+          <p:cNvPr id="4" name="CuadroTexto 3">
+            <a:extLst>
+              <a:ext uri="{FF2B5EF4-FFF2-40B4-BE49-F238E27FC236}">
+                <a16:creationId xmlns:a16="http://schemas.microsoft.com/office/drawing/2014/main" id="{16F4E814-E633-4E74-B20E-A393494FFAF1}"/>
+              </a:ext>
+            </a:extLst>
+          </p:cNvPr>
+          <p:cNvSpPr txBox="1"/>
+          <p:nvPr/>
+        </p:nvSpPr>
+        <p:spPr>
+          <a:xfrm>
+            <a:off x="811661" y="606977"/>
+            <a:ext cx="3514104" cy="707886"/>
+          </a:xfrm>
+          <a:prstGeom prst="rect">
+            <a:avLst/>
+          </a:prstGeom>
+          <a:noFill/>
+        </p:spPr>
+        <p:txBody>
+          <a:bodyPr wrap="none" rtlCol="0">
+            <a:spAutoFit/>
+          </a:bodyPr>
+          <a:lstStyle/>
+          <a:p>
+            <a:r>
+              <a:rPr lang="es-CO" sz="4000" b="1" dirty="0" err="1"/>
+              <a:t>Github</a:t>
+            </a:r>
+            <a:r>
+              <a:rPr lang="es-CO" sz="4000" b="1" dirty="0"/>
+              <a:t>: Video 1</a:t>
+            </a:r>
+            <a:endParaRPr lang="es-MX" sz="4000" b="1" dirty="0"/>
           </a:p>
         </p:txBody>
       </p:sp>
@@ -9912,6 +9953,142 @@
     <p:extLst>
       <p:ext uri="{BB962C8B-B14F-4D97-AF65-F5344CB8AC3E}">
         <p14:creationId xmlns:p14="http://schemas.microsoft.com/office/powerpoint/2010/main" val="2645177451"/>
+      </p:ext>
+    </p:extLst>
+  </p:cSld>
+  <p:clrMapOvr>
+    <a:masterClrMapping/>
+  </p:clrMapOvr>
+</p:sld>
+</file>
+
+<file path=ppt/slides/slide4.xml><?xml version="1.0" encoding="utf-8"?>
+<p:sld xmlns:a="http://schemas.openxmlformats.org/drawingml/2006/main" xmlns:r="http://schemas.openxmlformats.org/officeDocument/2006/relationships" xmlns:p="http://schemas.openxmlformats.org/presentationml/2006/main">
+  <p:cSld>
+    <p:spTree>
+      <p:nvGrpSpPr>
+        <p:cNvPr id="1" name=""/>
+        <p:cNvGrpSpPr/>
+        <p:nvPr/>
+      </p:nvGrpSpPr>
+      <p:grpSpPr>
+        <a:xfrm>
+          <a:off x="0" y="0"/>
+          <a:ext cx="0" cy="0"/>
+          <a:chOff x="0" y="0"/>
+          <a:chExt cx="0" cy="0"/>
+        </a:xfrm>
+      </p:grpSpPr>
+      <p:sp>
+        <p:nvSpPr>
+          <p:cNvPr id="4" name="CuadroTexto 3">
+            <a:extLst>
+              <a:ext uri="{FF2B5EF4-FFF2-40B4-BE49-F238E27FC236}">
+                <a16:creationId xmlns:a16="http://schemas.microsoft.com/office/drawing/2014/main" id="{672FF09E-E273-4B58-827A-BD4BACDB4EF3}"/>
+              </a:ext>
+            </a:extLst>
+          </p:cNvPr>
+          <p:cNvSpPr txBox="1"/>
+          <p:nvPr/>
+        </p:nvSpPr>
+        <p:spPr>
+          <a:xfrm>
+            <a:off x="418257" y="351795"/>
+            <a:ext cx="2248372" cy="707886"/>
+          </a:xfrm>
+          <a:prstGeom prst="rect">
+            <a:avLst/>
+          </a:prstGeom>
+          <a:noFill/>
+        </p:spPr>
+        <p:txBody>
+          <a:bodyPr wrap="none" rtlCol="0">
+            <a:spAutoFit/>
+          </a:bodyPr>
+          <a:lstStyle/>
+          <a:p>
+            <a:r>
+              <a:rPr lang="es-CO" sz="4000" b="1" dirty="0"/>
+              <a:t>Protocolo</a:t>
+            </a:r>
+            <a:endParaRPr lang="es-MX" sz="4000" b="1" dirty="0"/>
+          </a:p>
+        </p:txBody>
+      </p:sp>
+      <p:sp>
+        <p:nvSpPr>
+          <p:cNvPr id="6" name="CuadroTexto 5">
+            <a:extLst>
+              <a:ext uri="{FF2B5EF4-FFF2-40B4-BE49-F238E27FC236}">
+                <a16:creationId xmlns:a16="http://schemas.microsoft.com/office/drawing/2014/main" id="{0D572E8B-345E-4188-8742-D6E22C802E7A}"/>
+              </a:ext>
+            </a:extLst>
+          </p:cNvPr>
+          <p:cNvSpPr txBox="1"/>
+          <p:nvPr/>
+        </p:nvSpPr>
+        <p:spPr>
+          <a:xfrm>
+            <a:off x="4297102" y="336406"/>
+            <a:ext cx="6094070" cy="369332"/>
+          </a:xfrm>
+          <a:prstGeom prst="rect">
+            <a:avLst/>
+          </a:prstGeom>
+          <a:noFill/>
+        </p:spPr>
+        <p:txBody>
+          <a:bodyPr wrap="square">
+            <a:spAutoFit/>
+          </a:bodyPr>
+          <a:lstStyle/>
+          <a:p>
+            <a:r>
+              <a:rPr lang="en-US" dirty="0"/>
+              <a:t>https://es.wikipedia.org/wiki/Modelo_OSI</a:t>
+            </a:r>
+          </a:p>
+        </p:txBody>
+      </p:sp>
+      <p:sp>
+        <p:nvSpPr>
+          <p:cNvPr id="8" name="CuadroTexto 7">
+            <a:extLst>
+              <a:ext uri="{FF2B5EF4-FFF2-40B4-BE49-F238E27FC236}">
+                <a16:creationId xmlns:a16="http://schemas.microsoft.com/office/drawing/2014/main" id="{CB4227D7-CA4B-490C-959F-04331DC754B4}"/>
+              </a:ext>
+            </a:extLst>
+          </p:cNvPr>
+          <p:cNvSpPr txBox="1"/>
+          <p:nvPr/>
+        </p:nvSpPr>
+        <p:spPr>
+          <a:xfrm>
+            <a:off x="4297102" y="690349"/>
+            <a:ext cx="7277582" cy="369332"/>
+          </a:xfrm>
+          <a:prstGeom prst="rect">
+            <a:avLst/>
+          </a:prstGeom>
+          <a:noFill/>
+        </p:spPr>
+        <p:txBody>
+          <a:bodyPr wrap="square">
+            <a:spAutoFit/>
+          </a:bodyPr>
+          <a:lstStyle/>
+          <a:p>
+            <a:r>
+              <a:rPr lang="en-US" dirty="0"/>
+              <a:t>https://www.ibm.com/docs/es/aix/7.2?topic=protocol-tcpip-protocols</a:t>
+            </a:r>
+          </a:p>
+        </p:txBody>
+      </p:sp>
+    </p:spTree>
+    <p:extLst>
+      <p:ext uri="{BB962C8B-B14F-4D97-AF65-F5344CB8AC3E}">
+        <p14:creationId xmlns:p14="http://schemas.microsoft.com/office/powerpoint/2010/main" val="1474954072"/>
       </p:ext>
     </p:extLst>
   </p:cSld>

</xml_diff>